<commit_message>
Update documentation for v1.5rc
</commit_message>
<xml_diff>
--- a/docs/diagrams/SwitchThemeActivityDiagram.pptx
+++ b/docs/diagrams/SwitchThemeActivityDiagram.pptx
@@ -104,6 +104,11 @@
       </a:defRPr>
     </a:lvl9pPr>
   </p:defaultTextStyle>
+  <p:extLst>
+    <p:ext uri="{EFAFB233-063F-42B5-8137-9DF3F51BA10A}">
+      <p15:sldGuideLst xmlns:p15="http://schemas.microsoft.com/office/powerpoint/2012/main"/>
+    </p:ext>
+  </p:extLst>
 </p:presentation>
 </file>
 
@@ -238,7 +243,7 @@
           <a:p>
             <a:fld id="{753DDBD0-E449-2C4B-8211-B5B7A623FAA6}" type="datetimeFigureOut">
               <a:rPr lang="en-US" smtClean="0"/>
-              <a:t>10/31/17</a:t>
+              <a:t>11/7/17</a:t>
             </a:fld>
             <a:endParaRPr lang="en-US"/>
           </a:p>
@@ -408,7 +413,7 @@
           <a:p>
             <a:fld id="{753DDBD0-E449-2C4B-8211-B5B7A623FAA6}" type="datetimeFigureOut">
               <a:rPr lang="en-US" smtClean="0"/>
-              <a:t>10/31/17</a:t>
+              <a:t>11/7/17</a:t>
             </a:fld>
             <a:endParaRPr lang="en-US"/>
           </a:p>
@@ -588,7 +593,7 @@
           <a:p>
             <a:fld id="{753DDBD0-E449-2C4B-8211-B5B7A623FAA6}" type="datetimeFigureOut">
               <a:rPr lang="en-US" smtClean="0"/>
-              <a:t>10/31/17</a:t>
+              <a:t>11/7/17</a:t>
             </a:fld>
             <a:endParaRPr lang="en-US"/>
           </a:p>
@@ -758,7 +763,7 @@
           <a:p>
             <a:fld id="{753DDBD0-E449-2C4B-8211-B5B7A623FAA6}" type="datetimeFigureOut">
               <a:rPr lang="en-US" smtClean="0"/>
-              <a:t>10/31/17</a:t>
+              <a:t>11/7/17</a:t>
             </a:fld>
             <a:endParaRPr lang="en-US"/>
           </a:p>
@@ -1004,7 +1009,7 @@
           <a:p>
             <a:fld id="{753DDBD0-E449-2C4B-8211-B5B7A623FAA6}" type="datetimeFigureOut">
               <a:rPr lang="en-US" smtClean="0"/>
-              <a:t>10/31/17</a:t>
+              <a:t>11/7/17</a:t>
             </a:fld>
             <a:endParaRPr lang="en-US"/>
           </a:p>
@@ -1236,7 +1241,7 @@
           <a:p>
             <a:fld id="{753DDBD0-E449-2C4B-8211-B5B7A623FAA6}" type="datetimeFigureOut">
               <a:rPr lang="en-US" smtClean="0"/>
-              <a:t>10/31/17</a:t>
+              <a:t>11/7/17</a:t>
             </a:fld>
             <a:endParaRPr lang="en-US"/>
           </a:p>
@@ -1603,7 +1608,7 @@
           <a:p>
             <a:fld id="{753DDBD0-E449-2C4B-8211-B5B7A623FAA6}" type="datetimeFigureOut">
               <a:rPr lang="en-US" smtClean="0"/>
-              <a:t>10/31/17</a:t>
+              <a:t>11/7/17</a:t>
             </a:fld>
             <a:endParaRPr lang="en-US"/>
           </a:p>
@@ -1721,7 +1726,7 @@
           <a:p>
             <a:fld id="{753DDBD0-E449-2C4B-8211-B5B7A623FAA6}" type="datetimeFigureOut">
               <a:rPr lang="en-US" smtClean="0"/>
-              <a:t>10/31/17</a:t>
+              <a:t>11/7/17</a:t>
             </a:fld>
             <a:endParaRPr lang="en-US"/>
           </a:p>
@@ -1816,7 +1821,7 @@
           <a:p>
             <a:fld id="{753DDBD0-E449-2C4B-8211-B5B7A623FAA6}" type="datetimeFigureOut">
               <a:rPr lang="en-US" smtClean="0"/>
-              <a:t>10/31/17</a:t>
+              <a:t>11/7/17</a:t>
             </a:fld>
             <a:endParaRPr lang="en-US"/>
           </a:p>
@@ -2093,7 +2098,7 @@
           <a:p>
             <a:fld id="{753DDBD0-E449-2C4B-8211-B5B7A623FAA6}" type="datetimeFigureOut">
               <a:rPr lang="en-US" smtClean="0"/>
-              <a:t>10/31/17</a:t>
+              <a:t>11/7/17</a:t>
             </a:fld>
             <a:endParaRPr lang="en-US"/>
           </a:p>
@@ -2346,7 +2351,7 @@
           <a:p>
             <a:fld id="{753DDBD0-E449-2C4B-8211-B5B7A623FAA6}" type="datetimeFigureOut">
               <a:rPr lang="en-US" smtClean="0"/>
-              <a:t>10/31/17</a:t>
+              <a:t>11/7/17</a:t>
             </a:fld>
             <a:endParaRPr lang="en-US"/>
           </a:p>
@@ -2559,7 +2564,7 @@
           <a:p>
             <a:fld id="{753DDBD0-E449-2C4B-8211-B5B7A623FAA6}" type="datetimeFigureOut">
               <a:rPr lang="en-US" smtClean="0"/>
-              <a:t>10/31/17</a:t>
+              <a:t>11/7/17</a:t>
             </a:fld>
             <a:endParaRPr lang="en-US"/>
           </a:p>
@@ -3226,41 +3231,6 @@
           </a:p>
         </p:txBody>
       </p:sp>
-      <p:cxnSp>
-        <p:nvCxnSpPr>
-          <p:cNvPr id="12" name="Straight Arrow Connector 11"/>
-          <p:cNvCxnSpPr>
-            <a:endCxn id="14" idx="0"/>
-          </p:cNvCxnSpPr>
-          <p:nvPr/>
-        </p:nvCxnSpPr>
-        <p:spPr>
-          <a:xfrm>
-            <a:off x="7202184" y="4745048"/>
-            <a:ext cx="0" cy="395363"/>
-          </a:xfrm>
-          <a:prstGeom prst="straightConnector1">
-            <a:avLst/>
-          </a:prstGeom>
-          <a:ln>
-            <a:tailEnd type="triangle"/>
-          </a:ln>
-        </p:spPr>
-        <p:style>
-          <a:lnRef idx="1">
-            <a:schemeClr val="accent1"/>
-          </a:lnRef>
-          <a:fillRef idx="0">
-            <a:schemeClr val="accent1"/>
-          </a:fillRef>
-          <a:effectRef idx="0">
-            <a:schemeClr val="accent1"/>
-          </a:effectRef>
-          <a:fontRef idx="minor">
-            <a:schemeClr val="tx1"/>
-          </a:fontRef>
-        </p:style>
-      </p:cxnSp>
       <p:sp>
         <p:nvSpPr>
           <p:cNvPr id="13" name="Oval 12"/>
@@ -3347,53 +3317,217 @@
           </a:p>
         </p:txBody>
       </p:sp>
-      <p:sp>
-        <p:nvSpPr>
-          <p:cNvPr id="16" name="TextBox 15"/>
-          <p:cNvSpPr txBox="1"/>
+      <p:cxnSp>
+        <p:nvCxnSpPr>
+          <p:cNvPr id="15" name="Straight Arrow Connector 14"/>
+          <p:cNvCxnSpPr/>
+          <p:nvPr/>
+        </p:nvCxnSpPr>
+        <p:spPr>
+          <a:xfrm flipV="1">
+            <a:off x="7536719" y="3715295"/>
+            <a:ext cx="1299056" cy="2"/>
+          </a:xfrm>
+          <a:prstGeom prst="straightConnector1">
+            <a:avLst/>
+          </a:prstGeom>
+          <a:ln>
+            <a:tailEnd type="triangle"/>
+          </a:ln>
+        </p:spPr>
+        <p:style>
+          <a:lnRef idx="1">
+            <a:schemeClr val="accent1"/>
+          </a:lnRef>
+          <a:fillRef idx="0">
+            <a:schemeClr val="accent1"/>
+          </a:fillRef>
+          <a:effectRef idx="0">
+            <a:schemeClr val="accent1"/>
+          </a:effectRef>
+          <a:fontRef idx="minor">
+            <a:schemeClr val="tx1"/>
+          </a:fontRef>
+        </p:style>
+      </p:cxnSp>
+      <p:cxnSp>
+        <p:nvCxnSpPr>
+          <p:cNvPr id="17" name="Straight Arrow Connector 16"/>
+          <p:cNvCxnSpPr>
+            <a:stCxn id="11" idx="1"/>
+          </p:cNvCxnSpPr>
+          <p:nvPr/>
+        </p:nvCxnSpPr>
+        <p:spPr>
+          <a:xfrm flipH="1" flipV="1">
+            <a:off x="5363828" y="3715295"/>
+            <a:ext cx="1503821" cy="2"/>
+          </a:xfrm>
+          <a:prstGeom prst="straightConnector1">
+            <a:avLst/>
+          </a:prstGeom>
+          <a:ln>
+            <a:tailEnd type="triangle"/>
+          </a:ln>
+        </p:spPr>
+        <p:style>
+          <a:lnRef idx="1">
+            <a:schemeClr val="accent1"/>
+          </a:lnRef>
+          <a:fillRef idx="0">
+            <a:schemeClr val="accent1"/>
+          </a:fillRef>
+          <a:effectRef idx="0">
+            <a:schemeClr val="accent1"/>
+          </a:effectRef>
+          <a:fontRef idx="minor">
+            <a:schemeClr val="tx1"/>
+          </a:fontRef>
+        </p:style>
+      </p:cxnSp>
+      <p:sp>
+        <p:nvSpPr>
+          <p:cNvPr id="19" name="Rounded Rectangle 18"/>
+          <p:cNvSpPr/>
           <p:nvPr/>
         </p:nvSpPr>
         <p:spPr>
           <a:xfrm>
-            <a:off x="5363828" y="4375716"/>
-            <a:ext cx="3676712" cy="369332"/>
+            <a:off x="8835775" y="3389934"/>
+            <a:ext cx="916112" cy="655833"/>
           </a:xfrm>
-          <a:prstGeom prst="rect">
+          <a:prstGeom prst="roundRect">
             <a:avLst/>
           </a:prstGeom>
-          <a:noFill/>
         </p:spPr>
-        <p:txBody>
-          <a:bodyPr wrap="none" rtlCol="0">
-            <a:spAutoFit/>
-          </a:bodyPr>
-          <a:lstStyle/>
-          <a:p>
-            <a:r>
-              <a:rPr lang="en-US" smtClean="0"/>
-              <a:t>Toggle between light and dark theme</a:t>
-            </a:r>
-            <a:endParaRPr lang="en-US"/>
+        <p:style>
+          <a:lnRef idx="2">
+            <a:schemeClr val="accent1">
+              <a:shade val="50000"/>
+            </a:schemeClr>
+          </a:lnRef>
+          <a:fillRef idx="1">
+            <a:schemeClr val="accent1"/>
+          </a:fillRef>
+          <a:effectRef idx="0">
+            <a:schemeClr val="accent1"/>
+          </a:effectRef>
+          <a:fontRef idx="minor">
+            <a:schemeClr val="lt1"/>
+          </a:fontRef>
+        </p:style>
+        <p:txBody>
+          <a:bodyPr rtlCol="0" anchor="ctr"/>
+          <a:lstStyle/>
+          <a:p>
+            <a:pPr algn="ctr"/>
+            <a:r>
+              <a:rPr lang="en-US" smtClean="0"/>
+              <a:t>dark</a:t>
+            </a:r>
+            <a:endParaRPr lang="en-US" dirty="0"/>
+          </a:p>
+        </p:txBody>
+      </p:sp>
+      <p:sp>
+        <p:nvSpPr>
+          <p:cNvPr id="20" name="Rounded Rectangle 19"/>
+          <p:cNvSpPr/>
+          <p:nvPr/>
+        </p:nvSpPr>
+        <p:spPr>
+          <a:xfrm>
+            <a:off x="4447716" y="3389934"/>
+            <a:ext cx="916112" cy="655833"/>
+          </a:xfrm>
+          <a:prstGeom prst="roundRect">
+            <a:avLst/>
+          </a:prstGeom>
+        </p:spPr>
+        <p:style>
+          <a:lnRef idx="2">
+            <a:schemeClr val="accent1">
+              <a:shade val="50000"/>
+            </a:schemeClr>
+          </a:lnRef>
+          <a:fillRef idx="1">
+            <a:schemeClr val="accent1"/>
+          </a:fillRef>
+          <a:effectRef idx="0">
+            <a:schemeClr val="accent1"/>
+          </a:effectRef>
+          <a:fontRef idx="minor">
+            <a:schemeClr val="lt1"/>
+          </a:fontRef>
+        </p:style>
+        <p:txBody>
+          <a:bodyPr rtlCol="0" anchor="ctr"/>
+          <a:lstStyle/>
+          <a:p>
+            <a:pPr algn="ctr"/>
+            <a:r>
+              <a:rPr lang="en-US" dirty="0" smtClean="0"/>
+              <a:t>light</a:t>
+            </a:r>
+            <a:endParaRPr lang="en-US" dirty="0"/>
           </a:p>
         </p:txBody>
       </p:sp>
       <p:cxnSp>
         <p:nvCxnSpPr>
-          <p:cNvPr id="18" name="Straight Connector 17"/>
+          <p:cNvPr id="22" name="Straight Arrow Connector 21"/>
           <p:cNvCxnSpPr>
-            <a:stCxn id="11" idx="2"/>
-            <a:endCxn id="16" idx="0"/>
+            <a:stCxn id="20" idx="2"/>
+            <a:endCxn id="14" idx="2"/>
           </p:cNvCxnSpPr>
           <p:nvPr/>
         </p:nvCxnSpPr>
         <p:spPr>
           <a:xfrm>
-            <a:off x="7202184" y="4040659"/>
-            <a:ext cx="0" cy="335057"/>
+            <a:off x="4905772" y="4045767"/>
+            <a:ext cx="1961877" cy="1415920"/>
           </a:xfrm>
-          <a:prstGeom prst="line">
+          <a:prstGeom prst="straightConnector1">
             <a:avLst/>
           </a:prstGeom>
+          <a:ln>
+            <a:tailEnd type="triangle"/>
+          </a:ln>
+        </p:spPr>
+        <p:style>
+          <a:lnRef idx="1">
+            <a:schemeClr val="accent1"/>
+          </a:lnRef>
+          <a:fillRef idx="0">
+            <a:schemeClr val="accent1"/>
+          </a:fillRef>
+          <a:effectRef idx="0">
+            <a:schemeClr val="accent1"/>
+          </a:effectRef>
+          <a:fontRef idx="minor">
+            <a:schemeClr val="tx1"/>
+          </a:fontRef>
+        </p:style>
+      </p:cxnSp>
+      <p:cxnSp>
+        <p:nvCxnSpPr>
+          <p:cNvPr id="24" name="Straight Arrow Connector 23"/>
+          <p:cNvCxnSpPr>
+            <a:endCxn id="14" idx="6"/>
+          </p:cNvCxnSpPr>
+          <p:nvPr/>
+        </p:nvCxnSpPr>
+        <p:spPr>
+          <a:xfrm flipH="1">
+            <a:off x="7536719" y="4040659"/>
+            <a:ext cx="1757112" cy="1421028"/>
+          </a:xfrm>
+          <a:prstGeom prst="straightConnector1">
+            <a:avLst/>
+          </a:prstGeom>
+          <a:ln>
+            <a:tailEnd type="triangle"/>
+          </a:ln>
         </p:spPr>
         <p:style>
           <a:lnRef idx="1">

</xml_diff>